<commit_message>
Added Abstract; improved Intro, and revisited Challenges
</commit_message>
<xml_diff>
--- a/img/PN_MM.pptx
+++ b/img/PN_MM.pptx
@@ -243,7 +243,7 @@
           <a:p>
             <a:fld id="{7C30EC8E-E0C2-4688-8A21-31FBB5C9B8D6}" type="datetimeFigureOut">
               <a:rPr lang="en-GB" smtClean="0"/>
-              <a:t>15/07/2022</a:t>
+              <a:t>21/07/2022</a:t>
             </a:fld>
             <a:endParaRPr lang="en-GB"/>
           </a:p>
@@ -413,7 +413,7 @@
           <a:p>
             <a:fld id="{7C30EC8E-E0C2-4688-8A21-31FBB5C9B8D6}" type="datetimeFigureOut">
               <a:rPr lang="en-GB" smtClean="0"/>
-              <a:t>15/07/2022</a:t>
+              <a:t>21/07/2022</a:t>
             </a:fld>
             <a:endParaRPr lang="en-GB"/>
           </a:p>
@@ -593,7 +593,7 @@
           <a:p>
             <a:fld id="{7C30EC8E-E0C2-4688-8A21-31FBB5C9B8D6}" type="datetimeFigureOut">
               <a:rPr lang="en-GB" smtClean="0"/>
-              <a:t>15/07/2022</a:t>
+              <a:t>21/07/2022</a:t>
             </a:fld>
             <a:endParaRPr lang="en-GB"/>
           </a:p>
@@ -763,7 +763,7 @@
           <a:p>
             <a:fld id="{7C30EC8E-E0C2-4688-8A21-31FBB5C9B8D6}" type="datetimeFigureOut">
               <a:rPr lang="en-GB" smtClean="0"/>
-              <a:t>15/07/2022</a:t>
+              <a:t>21/07/2022</a:t>
             </a:fld>
             <a:endParaRPr lang="en-GB"/>
           </a:p>
@@ -1009,7 +1009,7 @@
           <a:p>
             <a:fld id="{7C30EC8E-E0C2-4688-8A21-31FBB5C9B8D6}" type="datetimeFigureOut">
               <a:rPr lang="en-GB" smtClean="0"/>
-              <a:t>15/07/2022</a:t>
+              <a:t>21/07/2022</a:t>
             </a:fld>
             <a:endParaRPr lang="en-GB"/>
           </a:p>
@@ -1241,7 +1241,7 @@
           <a:p>
             <a:fld id="{7C30EC8E-E0C2-4688-8A21-31FBB5C9B8D6}" type="datetimeFigureOut">
               <a:rPr lang="en-GB" smtClean="0"/>
-              <a:t>15/07/2022</a:t>
+              <a:t>21/07/2022</a:t>
             </a:fld>
             <a:endParaRPr lang="en-GB"/>
           </a:p>
@@ -1608,7 +1608,7 @@
           <a:p>
             <a:fld id="{7C30EC8E-E0C2-4688-8A21-31FBB5C9B8D6}" type="datetimeFigureOut">
               <a:rPr lang="en-GB" smtClean="0"/>
-              <a:t>15/07/2022</a:t>
+              <a:t>21/07/2022</a:t>
             </a:fld>
             <a:endParaRPr lang="en-GB"/>
           </a:p>
@@ -1726,7 +1726,7 @@
           <a:p>
             <a:fld id="{7C30EC8E-E0C2-4688-8A21-31FBB5C9B8D6}" type="datetimeFigureOut">
               <a:rPr lang="en-GB" smtClean="0"/>
-              <a:t>15/07/2022</a:t>
+              <a:t>21/07/2022</a:t>
             </a:fld>
             <a:endParaRPr lang="en-GB"/>
           </a:p>
@@ -1821,7 +1821,7 @@
           <a:p>
             <a:fld id="{7C30EC8E-E0C2-4688-8A21-31FBB5C9B8D6}" type="datetimeFigureOut">
               <a:rPr lang="en-GB" smtClean="0"/>
-              <a:t>15/07/2022</a:t>
+              <a:t>21/07/2022</a:t>
             </a:fld>
             <a:endParaRPr lang="en-GB"/>
           </a:p>
@@ -2098,7 +2098,7 @@
           <a:p>
             <a:fld id="{7C30EC8E-E0C2-4688-8A21-31FBB5C9B8D6}" type="datetimeFigureOut">
               <a:rPr lang="en-GB" smtClean="0"/>
-              <a:t>15/07/2022</a:t>
+              <a:t>21/07/2022</a:t>
             </a:fld>
             <a:endParaRPr lang="en-GB"/>
           </a:p>
@@ -2351,7 +2351,7 @@
           <a:p>
             <a:fld id="{7C30EC8E-E0C2-4688-8A21-31FBB5C9B8D6}" type="datetimeFigureOut">
               <a:rPr lang="en-GB" smtClean="0"/>
-              <a:t>15/07/2022</a:t>
+              <a:t>21/07/2022</a:t>
             </a:fld>
             <a:endParaRPr lang="en-GB"/>
           </a:p>
@@ -2564,7 +2564,7 @@
           <a:p>
             <a:fld id="{7C30EC8E-E0C2-4688-8A21-31FBB5C9B8D6}" type="datetimeFigureOut">
               <a:rPr lang="en-GB" smtClean="0"/>
-              <a:t>15/07/2022</a:t>
+              <a:t>21/07/2022</a:t>
             </a:fld>
             <a:endParaRPr lang="en-GB"/>
           </a:p>
@@ -3951,6 +3951,755 @@
           </a:p>
         </p:txBody>
       </p:sp>
+      <p:cxnSp>
+        <p:nvCxnSpPr>
+          <p:cNvPr id="3" name="Straight Connector 2"/>
+          <p:cNvCxnSpPr/>
+          <p:nvPr/>
+        </p:nvCxnSpPr>
+        <p:spPr>
+          <a:xfrm>
+            <a:off x="28855" y="2408221"/>
+            <a:ext cx="5040000" cy="0"/>
+          </a:xfrm>
+          <a:prstGeom prst="line">
+            <a:avLst/>
+          </a:prstGeom>
+          <a:noFill/>
+          <a:ln w="38100">
+            <a:solidFill>
+              <a:schemeClr val="tx1"/>
+            </a:solidFill>
+          </a:ln>
+        </p:spPr>
+        <p:style>
+          <a:lnRef idx="2">
+            <a:schemeClr val="accent1">
+              <a:shade val="50000"/>
+            </a:schemeClr>
+          </a:lnRef>
+          <a:fillRef idx="1">
+            <a:schemeClr val="accent1"/>
+          </a:fillRef>
+          <a:effectRef idx="0">
+            <a:schemeClr val="accent1"/>
+          </a:effectRef>
+          <a:fontRef idx="minor">
+            <a:schemeClr val="lt1"/>
+          </a:fontRef>
+        </p:style>
+      </p:cxnSp>
+      <p:sp>
+        <p:nvSpPr>
+          <p:cNvPr id="4" name="Oval 3"/>
+          <p:cNvSpPr/>
+          <p:nvPr/>
+        </p:nvSpPr>
+        <p:spPr>
+          <a:xfrm>
+            <a:off x="461727" y="2914012"/>
+            <a:ext cx="439230" cy="425513"/>
+          </a:xfrm>
+          <a:prstGeom prst="ellipse">
+            <a:avLst/>
+          </a:prstGeom>
+          <a:noFill/>
+          <a:ln w="25400">
+            <a:solidFill>
+              <a:schemeClr val="tx1"/>
+            </a:solidFill>
+          </a:ln>
+        </p:spPr>
+        <p:style>
+          <a:lnRef idx="2">
+            <a:schemeClr val="accent1">
+              <a:shade val="50000"/>
+            </a:schemeClr>
+          </a:lnRef>
+          <a:fillRef idx="1">
+            <a:schemeClr val="accent1"/>
+          </a:fillRef>
+          <a:effectRef idx="0">
+            <a:schemeClr val="accent1"/>
+          </a:effectRef>
+          <a:fontRef idx="minor">
+            <a:schemeClr val="lt1"/>
+          </a:fontRef>
+        </p:style>
+        <p:txBody>
+          <a:bodyPr rtlCol="0" anchor="ctr"/>
+          <a:lstStyle/>
+          <a:p>
+            <a:pPr algn="ctr"/>
+            <a:endParaRPr lang="en-GB"/>
+          </a:p>
+        </p:txBody>
+      </p:sp>
+      <p:sp>
+        <p:nvSpPr>
+          <p:cNvPr id="6" name="Rectangle 5"/>
+          <p:cNvSpPr/>
+          <p:nvPr/>
+        </p:nvSpPr>
+        <p:spPr>
+          <a:xfrm>
+            <a:off x="1798975" y="2519616"/>
+            <a:ext cx="81481" cy="534155"/>
+          </a:xfrm>
+          <a:prstGeom prst="rect">
+            <a:avLst/>
+          </a:prstGeom>
+          <a:solidFill>
+            <a:schemeClr val="tx1"/>
+          </a:solidFill>
+          <a:ln>
+            <a:noFill/>
+          </a:ln>
+        </p:spPr>
+        <p:style>
+          <a:lnRef idx="2">
+            <a:schemeClr val="accent1">
+              <a:shade val="50000"/>
+            </a:schemeClr>
+          </a:lnRef>
+          <a:fillRef idx="1">
+            <a:schemeClr val="accent1"/>
+          </a:fillRef>
+          <a:effectRef idx="0">
+            <a:schemeClr val="accent1"/>
+          </a:effectRef>
+          <a:fontRef idx="minor">
+            <a:schemeClr val="lt1"/>
+          </a:fontRef>
+        </p:style>
+        <p:txBody>
+          <a:bodyPr rtlCol="0" anchor="ctr"/>
+          <a:lstStyle/>
+          <a:p>
+            <a:pPr algn="ctr"/>
+            <a:endParaRPr lang="en-GB"/>
+          </a:p>
+        </p:txBody>
+      </p:sp>
+      <p:sp>
+        <p:nvSpPr>
+          <p:cNvPr id="28" name="Oval 27"/>
+          <p:cNvSpPr/>
+          <p:nvPr/>
+        </p:nvSpPr>
+        <p:spPr>
+          <a:xfrm>
+            <a:off x="2898869" y="2573937"/>
+            <a:ext cx="439230" cy="425513"/>
+          </a:xfrm>
+          <a:prstGeom prst="ellipse">
+            <a:avLst/>
+          </a:prstGeom>
+          <a:noFill/>
+          <a:ln w="25400">
+            <a:solidFill>
+              <a:schemeClr val="tx1"/>
+            </a:solidFill>
+          </a:ln>
+        </p:spPr>
+        <p:style>
+          <a:lnRef idx="2">
+            <a:schemeClr val="accent1">
+              <a:shade val="50000"/>
+            </a:schemeClr>
+          </a:lnRef>
+          <a:fillRef idx="1">
+            <a:schemeClr val="accent1"/>
+          </a:fillRef>
+          <a:effectRef idx="0">
+            <a:schemeClr val="accent1"/>
+          </a:effectRef>
+          <a:fontRef idx="minor">
+            <a:schemeClr val="lt1"/>
+          </a:fontRef>
+        </p:style>
+        <p:txBody>
+          <a:bodyPr rtlCol="0" anchor="ctr"/>
+          <a:lstStyle/>
+          <a:p>
+            <a:pPr algn="ctr"/>
+            <a:endParaRPr lang="en-GB"/>
+          </a:p>
+        </p:txBody>
+      </p:sp>
+      <p:sp>
+        <p:nvSpPr>
+          <p:cNvPr id="30" name="Rectangle 29"/>
+          <p:cNvSpPr/>
+          <p:nvPr/>
+        </p:nvSpPr>
+        <p:spPr>
+          <a:xfrm>
+            <a:off x="1803813" y="3199766"/>
+            <a:ext cx="81481" cy="534155"/>
+          </a:xfrm>
+          <a:prstGeom prst="rect">
+            <a:avLst/>
+          </a:prstGeom>
+          <a:solidFill>
+            <a:schemeClr val="tx1"/>
+          </a:solidFill>
+          <a:ln>
+            <a:noFill/>
+          </a:ln>
+        </p:spPr>
+        <p:style>
+          <a:lnRef idx="2">
+            <a:schemeClr val="accent1">
+              <a:shade val="50000"/>
+            </a:schemeClr>
+          </a:lnRef>
+          <a:fillRef idx="1">
+            <a:schemeClr val="accent1"/>
+          </a:fillRef>
+          <a:effectRef idx="0">
+            <a:schemeClr val="accent1"/>
+          </a:effectRef>
+          <a:fontRef idx="minor">
+            <a:schemeClr val="lt1"/>
+          </a:fontRef>
+        </p:style>
+        <p:txBody>
+          <a:bodyPr rtlCol="0" anchor="ctr"/>
+          <a:lstStyle/>
+          <a:p>
+            <a:pPr algn="ctr"/>
+            <a:endParaRPr lang="en-GB"/>
+          </a:p>
+        </p:txBody>
+      </p:sp>
+      <p:sp>
+        <p:nvSpPr>
+          <p:cNvPr id="31" name="Oval 30"/>
+          <p:cNvSpPr/>
+          <p:nvPr/>
+        </p:nvSpPr>
+        <p:spPr>
+          <a:xfrm>
+            <a:off x="2903707" y="3254087"/>
+            <a:ext cx="439230" cy="425513"/>
+          </a:xfrm>
+          <a:prstGeom prst="ellipse">
+            <a:avLst/>
+          </a:prstGeom>
+          <a:noFill/>
+          <a:ln w="25400">
+            <a:solidFill>
+              <a:schemeClr val="tx1"/>
+            </a:solidFill>
+          </a:ln>
+        </p:spPr>
+        <p:style>
+          <a:lnRef idx="2">
+            <a:schemeClr val="accent1">
+              <a:shade val="50000"/>
+            </a:schemeClr>
+          </a:lnRef>
+          <a:fillRef idx="1">
+            <a:schemeClr val="accent1"/>
+          </a:fillRef>
+          <a:effectRef idx="0">
+            <a:schemeClr val="accent1"/>
+          </a:effectRef>
+          <a:fontRef idx="minor">
+            <a:schemeClr val="lt1"/>
+          </a:fontRef>
+        </p:style>
+        <p:txBody>
+          <a:bodyPr rtlCol="0" anchor="ctr"/>
+          <a:lstStyle/>
+          <a:p>
+            <a:pPr algn="ctr"/>
+            <a:endParaRPr lang="en-GB"/>
+          </a:p>
+        </p:txBody>
+      </p:sp>
+      <p:sp>
+        <p:nvSpPr>
+          <p:cNvPr id="32" name="Rectangle 31"/>
+          <p:cNvSpPr/>
+          <p:nvPr/>
+        </p:nvSpPr>
+        <p:spPr>
+          <a:xfrm>
+            <a:off x="4083777" y="2859690"/>
+            <a:ext cx="81481" cy="534155"/>
+          </a:xfrm>
+          <a:prstGeom prst="rect">
+            <a:avLst/>
+          </a:prstGeom>
+          <a:solidFill>
+            <a:schemeClr val="tx1"/>
+          </a:solidFill>
+          <a:ln>
+            <a:noFill/>
+          </a:ln>
+        </p:spPr>
+        <p:style>
+          <a:lnRef idx="2">
+            <a:schemeClr val="accent1">
+              <a:shade val="50000"/>
+            </a:schemeClr>
+          </a:lnRef>
+          <a:fillRef idx="1">
+            <a:schemeClr val="accent1"/>
+          </a:fillRef>
+          <a:effectRef idx="0">
+            <a:schemeClr val="accent1"/>
+          </a:effectRef>
+          <a:fontRef idx="minor">
+            <a:schemeClr val="lt1"/>
+          </a:fontRef>
+        </p:style>
+        <p:txBody>
+          <a:bodyPr rtlCol="0" anchor="ctr"/>
+          <a:lstStyle/>
+          <a:p>
+            <a:pPr algn="ctr"/>
+            <a:endParaRPr lang="en-GB"/>
+          </a:p>
+        </p:txBody>
+      </p:sp>
+      <p:cxnSp>
+        <p:nvCxnSpPr>
+          <p:cNvPr id="10" name="Straight Arrow Connector 9"/>
+          <p:cNvCxnSpPr>
+            <a:stCxn id="4" idx="6"/>
+            <a:endCxn id="6" idx="1"/>
+          </p:cNvCxnSpPr>
+          <p:nvPr/>
+        </p:nvCxnSpPr>
+        <p:spPr>
+          <a:xfrm flipV="1">
+            <a:off x="900957" y="2786694"/>
+            <a:ext cx="898018" cy="340075"/>
+          </a:xfrm>
+          <a:prstGeom prst="straightConnector1">
+            <a:avLst/>
+          </a:prstGeom>
+          <a:noFill/>
+          <a:ln w="25400">
+            <a:solidFill>
+              <a:schemeClr val="tx1"/>
+            </a:solidFill>
+            <a:tailEnd type="arrow"/>
+          </a:ln>
+        </p:spPr>
+        <p:style>
+          <a:lnRef idx="2">
+            <a:schemeClr val="accent1">
+              <a:shade val="50000"/>
+            </a:schemeClr>
+          </a:lnRef>
+          <a:fillRef idx="1">
+            <a:schemeClr val="accent1"/>
+          </a:fillRef>
+          <a:effectRef idx="0">
+            <a:schemeClr val="accent1"/>
+          </a:effectRef>
+          <a:fontRef idx="minor">
+            <a:schemeClr val="lt1"/>
+          </a:fontRef>
+        </p:style>
+      </p:cxnSp>
+      <p:cxnSp>
+        <p:nvCxnSpPr>
+          <p:cNvPr id="35" name="Straight Arrow Connector 34"/>
+          <p:cNvCxnSpPr>
+            <a:stCxn id="4" idx="6"/>
+            <a:endCxn id="30" idx="1"/>
+          </p:cNvCxnSpPr>
+          <p:nvPr/>
+        </p:nvCxnSpPr>
+        <p:spPr>
+          <a:xfrm>
+            <a:off x="900957" y="3126769"/>
+            <a:ext cx="902856" cy="340075"/>
+          </a:xfrm>
+          <a:prstGeom prst="straightConnector1">
+            <a:avLst/>
+          </a:prstGeom>
+          <a:noFill/>
+          <a:ln w="25400">
+            <a:solidFill>
+              <a:schemeClr val="tx1"/>
+            </a:solidFill>
+            <a:tailEnd type="arrow"/>
+          </a:ln>
+        </p:spPr>
+        <p:style>
+          <a:lnRef idx="2">
+            <a:schemeClr val="accent1">
+              <a:shade val="50000"/>
+            </a:schemeClr>
+          </a:lnRef>
+          <a:fillRef idx="1">
+            <a:schemeClr val="accent1"/>
+          </a:fillRef>
+          <a:effectRef idx="0">
+            <a:schemeClr val="accent1"/>
+          </a:effectRef>
+          <a:fontRef idx="minor">
+            <a:schemeClr val="lt1"/>
+          </a:fontRef>
+        </p:style>
+      </p:cxnSp>
+      <p:cxnSp>
+        <p:nvCxnSpPr>
+          <p:cNvPr id="37" name="Straight Arrow Connector 36"/>
+          <p:cNvCxnSpPr>
+            <a:stCxn id="6" idx="3"/>
+            <a:endCxn id="28" idx="2"/>
+          </p:cNvCxnSpPr>
+          <p:nvPr/>
+        </p:nvCxnSpPr>
+        <p:spPr>
+          <a:xfrm>
+            <a:off x="1880456" y="2786694"/>
+            <a:ext cx="1018413" cy="0"/>
+          </a:xfrm>
+          <a:prstGeom prst="straightConnector1">
+            <a:avLst/>
+          </a:prstGeom>
+          <a:noFill/>
+          <a:ln w="25400">
+            <a:solidFill>
+              <a:schemeClr val="tx1"/>
+            </a:solidFill>
+            <a:tailEnd type="arrow"/>
+          </a:ln>
+        </p:spPr>
+        <p:style>
+          <a:lnRef idx="2">
+            <a:schemeClr val="accent1">
+              <a:shade val="50000"/>
+            </a:schemeClr>
+          </a:lnRef>
+          <a:fillRef idx="1">
+            <a:schemeClr val="accent1"/>
+          </a:fillRef>
+          <a:effectRef idx="0">
+            <a:schemeClr val="accent1"/>
+          </a:effectRef>
+          <a:fontRef idx="minor">
+            <a:schemeClr val="lt1"/>
+          </a:fontRef>
+        </p:style>
+      </p:cxnSp>
+      <p:cxnSp>
+        <p:nvCxnSpPr>
+          <p:cNvPr id="40" name="Straight Arrow Connector 39"/>
+          <p:cNvCxnSpPr>
+            <a:stCxn id="30" idx="3"/>
+            <a:endCxn id="31" idx="2"/>
+          </p:cNvCxnSpPr>
+          <p:nvPr/>
+        </p:nvCxnSpPr>
+        <p:spPr>
+          <a:xfrm>
+            <a:off x="1885294" y="3466844"/>
+            <a:ext cx="1018413" cy="0"/>
+          </a:xfrm>
+          <a:prstGeom prst="straightConnector1">
+            <a:avLst/>
+          </a:prstGeom>
+          <a:noFill/>
+          <a:ln w="25400">
+            <a:solidFill>
+              <a:schemeClr val="tx1"/>
+            </a:solidFill>
+            <a:tailEnd type="arrow"/>
+          </a:ln>
+        </p:spPr>
+        <p:style>
+          <a:lnRef idx="2">
+            <a:schemeClr val="accent1">
+              <a:shade val="50000"/>
+            </a:schemeClr>
+          </a:lnRef>
+          <a:fillRef idx="1">
+            <a:schemeClr val="accent1"/>
+          </a:fillRef>
+          <a:effectRef idx="0">
+            <a:schemeClr val="accent1"/>
+          </a:effectRef>
+          <a:fontRef idx="minor">
+            <a:schemeClr val="lt1"/>
+          </a:fontRef>
+        </p:style>
+      </p:cxnSp>
+      <p:cxnSp>
+        <p:nvCxnSpPr>
+          <p:cNvPr id="45" name="Straight Arrow Connector 44"/>
+          <p:cNvCxnSpPr>
+            <a:stCxn id="28" idx="6"/>
+            <a:endCxn id="32" idx="1"/>
+          </p:cNvCxnSpPr>
+          <p:nvPr/>
+        </p:nvCxnSpPr>
+        <p:spPr>
+          <a:xfrm>
+            <a:off x="3338099" y="2786694"/>
+            <a:ext cx="745678" cy="340074"/>
+          </a:xfrm>
+          <a:prstGeom prst="straightConnector1">
+            <a:avLst/>
+          </a:prstGeom>
+          <a:noFill/>
+          <a:ln w="25400">
+            <a:solidFill>
+              <a:schemeClr val="tx1"/>
+            </a:solidFill>
+            <a:tailEnd type="arrow"/>
+          </a:ln>
+        </p:spPr>
+        <p:style>
+          <a:lnRef idx="2">
+            <a:schemeClr val="accent1">
+              <a:shade val="50000"/>
+            </a:schemeClr>
+          </a:lnRef>
+          <a:fillRef idx="1">
+            <a:schemeClr val="accent1"/>
+          </a:fillRef>
+          <a:effectRef idx="0">
+            <a:schemeClr val="accent1"/>
+          </a:effectRef>
+          <a:fontRef idx="minor">
+            <a:schemeClr val="lt1"/>
+          </a:fontRef>
+        </p:style>
+      </p:cxnSp>
+      <p:cxnSp>
+        <p:nvCxnSpPr>
+          <p:cNvPr id="47" name="Straight Arrow Connector 46"/>
+          <p:cNvCxnSpPr>
+            <a:stCxn id="31" idx="6"/>
+            <a:endCxn id="32" idx="1"/>
+          </p:cNvCxnSpPr>
+          <p:nvPr/>
+        </p:nvCxnSpPr>
+        <p:spPr>
+          <a:xfrm flipV="1">
+            <a:off x="3342937" y="3126768"/>
+            <a:ext cx="740840" cy="340076"/>
+          </a:xfrm>
+          <a:prstGeom prst="straightConnector1">
+            <a:avLst/>
+          </a:prstGeom>
+          <a:noFill/>
+          <a:ln w="25400">
+            <a:solidFill>
+              <a:schemeClr val="tx1"/>
+            </a:solidFill>
+            <a:tailEnd type="arrow"/>
+          </a:ln>
+        </p:spPr>
+        <p:style>
+          <a:lnRef idx="2">
+            <a:schemeClr val="accent1">
+              <a:shade val="50000"/>
+            </a:schemeClr>
+          </a:lnRef>
+          <a:fillRef idx="1">
+            <a:schemeClr val="accent1"/>
+          </a:fillRef>
+          <a:effectRef idx="0">
+            <a:schemeClr val="accent1"/>
+          </a:effectRef>
+          <a:fontRef idx="minor">
+            <a:schemeClr val="lt1"/>
+          </a:fontRef>
+        </p:style>
+      </p:cxnSp>
+      <p:cxnSp>
+        <p:nvCxnSpPr>
+          <p:cNvPr id="33" name="Elbow Connector 32"/>
+          <p:cNvCxnSpPr>
+            <a:stCxn id="32" idx="3"/>
+            <a:endCxn id="4" idx="4"/>
+          </p:cNvCxnSpPr>
+          <p:nvPr/>
+        </p:nvCxnSpPr>
+        <p:spPr>
+          <a:xfrm flipH="1">
+            <a:off x="681342" y="3126768"/>
+            <a:ext cx="3483916" cy="212757"/>
+          </a:xfrm>
+          <a:prstGeom prst="bentConnector4">
+            <a:avLst>
+              <a:gd name="adj1" fmla="val -6562"/>
+              <a:gd name="adj2" fmla="val 339360"/>
+            </a:avLst>
+          </a:prstGeom>
+          <a:noFill/>
+          <a:ln w="25400">
+            <a:solidFill>
+              <a:schemeClr val="tx1"/>
+            </a:solidFill>
+            <a:tailEnd type="arrow"/>
+          </a:ln>
+        </p:spPr>
+        <p:style>
+          <a:lnRef idx="2">
+            <a:schemeClr val="accent1">
+              <a:shade val="50000"/>
+            </a:schemeClr>
+          </a:lnRef>
+          <a:fillRef idx="1">
+            <a:schemeClr val="accent1"/>
+          </a:fillRef>
+          <a:effectRef idx="0">
+            <a:schemeClr val="accent1"/>
+          </a:effectRef>
+          <a:fontRef idx="minor">
+            <a:schemeClr val="lt1"/>
+          </a:fontRef>
+        </p:style>
+      </p:cxnSp>
+      <p:sp>
+        <p:nvSpPr>
+          <p:cNvPr id="38" name="Oval 37"/>
+          <p:cNvSpPr/>
+          <p:nvPr/>
+        </p:nvSpPr>
+        <p:spPr>
+          <a:xfrm>
+            <a:off x="617968" y="2999258"/>
+            <a:ext cx="126748" cy="127319"/>
+          </a:xfrm>
+          <a:prstGeom prst="ellipse">
+            <a:avLst/>
+          </a:prstGeom>
+          <a:solidFill>
+            <a:srgbClr val="FF0000"/>
+          </a:solidFill>
+          <a:ln>
+            <a:noFill/>
+          </a:ln>
+        </p:spPr>
+        <p:style>
+          <a:lnRef idx="2">
+            <a:schemeClr val="accent1">
+              <a:shade val="50000"/>
+            </a:schemeClr>
+          </a:lnRef>
+          <a:fillRef idx="1">
+            <a:schemeClr val="accent1"/>
+          </a:fillRef>
+          <a:effectRef idx="0">
+            <a:schemeClr val="accent1"/>
+          </a:effectRef>
+          <a:fontRef idx="minor">
+            <a:schemeClr val="lt1"/>
+          </a:fontRef>
+        </p:style>
+        <p:txBody>
+          <a:bodyPr rtlCol="0" anchor="ctr"/>
+          <a:lstStyle/>
+          <a:p>
+            <a:pPr algn="ctr"/>
+            <a:endParaRPr lang="en-GB"/>
+          </a:p>
+        </p:txBody>
+      </p:sp>
+      <p:sp>
+        <p:nvSpPr>
+          <p:cNvPr id="54" name="Oval 53"/>
+          <p:cNvSpPr/>
+          <p:nvPr/>
+        </p:nvSpPr>
+        <p:spPr>
+          <a:xfrm>
+            <a:off x="617968" y="3152557"/>
+            <a:ext cx="126748" cy="127319"/>
+          </a:xfrm>
+          <a:prstGeom prst="ellipse">
+            <a:avLst/>
+          </a:prstGeom>
+          <a:solidFill>
+            <a:srgbClr val="FF0000"/>
+          </a:solidFill>
+          <a:ln>
+            <a:noFill/>
+          </a:ln>
+        </p:spPr>
+        <p:style>
+          <a:lnRef idx="2">
+            <a:schemeClr val="accent1">
+              <a:shade val="50000"/>
+            </a:schemeClr>
+          </a:lnRef>
+          <a:fillRef idx="1">
+            <a:schemeClr val="accent1"/>
+          </a:fillRef>
+          <a:effectRef idx="0">
+            <a:schemeClr val="accent1"/>
+          </a:effectRef>
+          <a:fontRef idx="minor">
+            <a:schemeClr val="lt1"/>
+          </a:fontRef>
+        </p:style>
+        <p:txBody>
+          <a:bodyPr rtlCol="0" anchor="ctr"/>
+          <a:lstStyle/>
+          <a:p>
+            <a:pPr algn="ctr"/>
+            <a:endParaRPr lang="en-GB"/>
+          </a:p>
+        </p:txBody>
+      </p:sp>
+      <p:sp>
+        <p:nvSpPr>
+          <p:cNvPr id="59" name="Oval 58"/>
+          <p:cNvSpPr/>
+          <p:nvPr/>
+        </p:nvSpPr>
+        <p:spPr>
+          <a:xfrm>
+            <a:off x="3059948" y="3403183"/>
+            <a:ext cx="126748" cy="127319"/>
+          </a:xfrm>
+          <a:prstGeom prst="ellipse">
+            <a:avLst/>
+          </a:prstGeom>
+          <a:solidFill>
+            <a:srgbClr val="FF0000"/>
+          </a:solidFill>
+          <a:ln>
+            <a:noFill/>
+          </a:ln>
+        </p:spPr>
+        <p:style>
+          <a:lnRef idx="2">
+            <a:schemeClr val="accent1">
+              <a:shade val="50000"/>
+            </a:schemeClr>
+          </a:lnRef>
+          <a:fillRef idx="1">
+            <a:schemeClr val="accent1"/>
+          </a:fillRef>
+          <a:effectRef idx="0">
+            <a:schemeClr val="accent1"/>
+          </a:effectRef>
+          <a:fontRef idx="minor">
+            <a:schemeClr val="lt1"/>
+          </a:fontRef>
+        </p:style>
+        <p:txBody>
+          <a:bodyPr rtlCol="0" anchor="ctr"/>
+          <a:lstStyle/>
+          <a:p>
+            <a:pPr algn="ctr"/>
+            <a:endParaRPr lang="en-GB"/>
+          </a:p>
+        </p:txBody>
+      </p:sp>
     </p:spTree>
     <p:extLst>
       <p:ext uri="{BB962C8B-B14F-4D97-AF65-F5344CB8AC3E}">

</xml_diff>